<commit_message>
git and github tutorial modified
</commit_message>
<xml_diff>
--- a/git_and_github.pptx
+++ b/git_and_github.pptx
@@ -4876,7 +4876,104 @@
               <a:rPr lang="" altLang="en-US"/>
               <a:t>Thank you</a:t>
             </a:r>
-            <a:endParaRPr lang="" altLang="en-US"/>
+            <a:endParaRPr lang="en-US" altLang="en-US"/>
+          </a:p>
+        </p:txBody>
+      </p:sp>
+      <p:sp>
+        <p:nvSpPr>
+          <p:cNvPr id="5" name="Title 3"/>
+          <p:cNvSpPr>
+            <a:spLocks noGrp="1"/>
+          </p:cNvSpPr>
+          <p:nvPr/>
+        </p:nvSpPr>
+        <p:spPr>
+          <a:xfrm>
+            <a:off x="805180" y="4974273"/>
+            <a:ext cx="10972800" cy="1143000"/>
+          </a:xfrm>
+          <a:prstGeom prst="rect">
+            <a:avLst/>
+          </a:prstGeom>
+          <a:noFill/>
+          <a:ln w="9525">
+            <a:noFill/>
+          </a:ln>
+        </p:spPr>
+        <p:txBody>
+          <a:bodyPr anchor="ctr" anchorCtr="0"/>
+          <a:lstStyle>
+            <a:lvl1pPr marL="0" lvl="0" indent="0" algn="ctr" defTabSz="914400" eaLnBrk="1" fontAlgn="base" latinLnBrk="0" hangingPunct="1">
+              <a:lnSpc>
+                <a:spcPct val="100000"/>
+              </a:lnSpc>
+              <a:spcBef>
+                <a:spcPct val="0"/>
+              </a:spcBef>
+              <a:spcAft>
+                <a:spcPct val="0"/>
+              </a:spcAft>
+              <a:buNone/>
+              <a:defRPr sz="4400" b="0" i="0" u="none" kern="1200" baseline="0">
+                <a:solidFill>
+                  <a:schemeClr val="tx2"/>
+                </a:solidFill>
+                <a:latin typeface="+mj-lt"/>
+                <a:ea typeface="+mj-ea"/>
+                <a:cs typeface="+mj-cs"/>
+              </a:defRPr>
+            </a:lvl1pPr>
+          </a:lstStyle>
+          <a:p>
+            <a:r>
+              <a:rPr lang="en-US" altLang="en-US" sz="3200">
+                <a:sym typeface="+mn-ea"/>
+              </a:rPr>
+              <a:t>All course materials are and will be available on</a:t>
+            </a:r>
+            <a:br>
+              <a:rPr lang="en-US" altLang="en-US" sz="3200">
+                <a:sym typeface="+mn-ea"/>
+              </a:rPr>
+            </a:br>
+            <a:r>
+              <a:rPr lang="en-US" altLang="en-US" sz="3200">
+                <a:solidFill>
+                  <a:srgbClr val="7030A0"/>
+                </a:solidFill>
+                <a:sym typeface="+mn-ea"/>
+              </a:rPr>
+              <a:t>https://</a:t>
+            </a:r>
+            <a:r>
+              <a:rPr lang="en-US" altLang="en-US" sz="3200">
+                <a:solidFill>
+                  <a:srgbClr val="00B050"/>
+                </a:solidFill>
+                <a:sym typeface="+mn-ea"/>
+              </a:rPr>
+              <a:t>github.com</a:t>
+            </a:r>
+            <a:r>
+              <a:rPr lang="en-US" altLang="en-US" sz="3200">
+                <a:solidFill>
+                  <a:srgbClr val="CC0000"/>
+                </a:solidFill>
+                <a:sym typeface="+mn-ea"/>
+              </a:rPr>
+              <a:t>/Suranjan77/</a:t>
+            </a:r>
+            <a:r>
+              <a:rPr lang="en-US" altLang="en-US" sz="3200">
+                <a:solidFill>
+                  <a:srgbClr val="00B050"/>
+                </a:solidFill>
+                <a:sym typeface="+mn-ea"/>
+              </a:rPr>
+              <a:t>course-materials</a:t>
+            </a:r>
+            <a:endParaRPr lang="en-US" altLang="en-US" sz="3200"/>
           </a:p>
         </p:txBody>
       </p:sp>

</xml_diff>